<commit_message>
commented out tf.logging usage
</commit_message>
<xml_diff>
--- a/documentations/codeflow_asm.pptx
+++ b/documentations/codeflow_asm.pptx
@@ -260,7 +260,7 @@
           <a:p>
             <a:fld id="{330F189F-FDCA-3B49-BD71-3758360E44DC}" type="datetimeFigureOut">
               <a:rPr lang="en-US" smtClean="0"/>
-              <a:t>4/15/20</a:t>
+              <a:t>4/28/20</a:t>
             </a:fld>
             <a:endParaRPr lang="en-US"/>
           </a:p>
@@ -458,7 +458,7 @@
           <a:p>
             <a:fld id="{330F189F-FDCA-3B49-BD71-3758360E44DC}" type="datetimeFigureOut">
               <a:rPr lang="en-US" smtClean="0"/>
-              <a:t>4/15/20</a:t>
+              <a:t>4/28/20</a:t>
             </a:fld>
             <a:endParaRPr lang="en-US"/>
           </a:p>
@@ -666,7 +666,7 @@
           <a:p>
             <a:fld id="{330F189F-FDCA-3B49-BD71-3758360E44DC}" type="datetimeFigureOut">
               <a:rPr lang="en-US" smtClean="0"/>
-              <a:t>4/15/20</a:t>
+              <a:t>4/28/20</a:t>
             </a:fld>
             <a:endParaRPr lang="en-US"/>
           </a:p>
@@ -864,7 +864,7 @@
           <a:p>
             <a:fld id="{330F189F-FDCA-3B49-BD71-3758360E44DC}" type="datetimeFigureOut">
               <a:rPr lang="en-US" smtClean="0"/>
-              <a:t>4/15/20</a:t>
+              <a:t>4/28/20</a:t>
             </a:fld>
             <a:endParaRPr lang="en-US"/>
           </a:p>
@@ -1139,7 +1139,7 @@
           <a:p>
             <a:fld id="{330F189F-FDCA-3B49-BD71-3758360E44DC}" type="datetimeFigureOut">
               <a:rPr lang="en-US" smtClean="0"/>
-              <a:t>4/15/20</a:t>
+              <a:t>4/28/20</a:t>
             </a:fld>
             <a:endParaRPr lang="en-US"/>
           </a:p>
@@ -1404,7 +1404,7 @@
           <a:p>
             <a:fld id="{330F189F-FDCA-3B49-BD71-3758360E44DC}" type="datetimeFigureOut">
               <a:rPr lang="en-US" smtClean="0"/>
-              <a:t>4/15/20</a:t>
+              <a:t>4/28/20</a:t>
             </a:fld>
             <a:endParaRPr lang="en-US"/>
           </a:p>
@@ -1816,7 +1816,7 @@
           <a:p>
             <a:fld id="{330F189F-FDCA-3B49-BD71-3758360E44DC}" type="datetimeFigureOut">
               <a:rPr lang="en-US" smtClean="0"/>
-              <a:t>4/15/20</a:t>
+              <a:t>4/28/20</a:t>
             </a:fld>
             <a:endParaRPr lang="en-US"/>
           </a:p>
@@ -1957,7 +1957,7 @@
           <a:p>
             <a:fld id="{330F189F-FDCA-3B49-BD71-3758360E44DC}" type="datetimeFigureOut">
               <a:rPr lang="en-US" smtClean="0"/>
-              <a:t>4/15/20</a:t>
+              <a:t>4/28/20</a:t>
             </a:fld>
             <a:endParaRPr lang="en-US"/>
           </a:p>
@@ -2070,7 +2070,7 @@
           <a:p>
             <a:fld id="{330F189F-FDCA-3B49-BD71-3758360E44DC}" type="datetimeFigureOut">
               <a:rPr lang="en-US" smtClean="0"/>
-              <a:t>4/15/20</a:t>
+              <a:t>4/28/20</a:t>
             </a:fld>
             <a:endParaRPr lang="en-US"/>
           </a:p>
@@ -2381,7 +2381,7 @@
           <a:p>
             <a:fld id="{330F189F-FDCA-3B49-BD71-3758360E44DC}" type="datetimeFigureOut">
               <a:rPr lang="en-US" smtClean="0"/>
-              <a:t>4/15/20</a:t>
+              <a:t>4/28/20</a:t>
             </a:fld>
             <a:endParaRPr lang="en-US"/>
           </a:p>
@@ -2669,7 +2669,7 @@
           <a:p>
             <a:fld id="{330F189F-FDCA-3B49-BD71-3758360E44DC}" type="datetimeFigureOut">
               <a:rPr lang="en-US" smtClean="0"/>
-              <a:t>4/15/20</a:t>
+              <a:t>4/28/20</a:t>
             </a:fld>
             <a:endParaRPr lang="en-US"/>
           </a:p>
@@ -2910,7 +2910,7 @@
           <a:p>
             <a:fld id="{330F189F-FDCA-3B49-BD71-3758360E44DC}" type="datetimeFigureOut">
               <a:rPr lang="en-US" smtClean="0"/>
-              <a:t>4/15/20</a:t>
+              <a:t>4/28/20</a:t>
             </a:fld>
             <a:endParaRPr lang="en-US"/>
           </a:p>
@@ -3342,7 +3342,7 @@
           <p:nvPr>
             <p:extLst>
               <p:ext uri="{D42A27DB-BD31-4B8C-83A1-F6EECF244321}">
-                <p14:modId xmlns:p14="http://schemas.microsoft.com/office/powerpoint/2010/main" val="4036901382"/>
+                <p14:modId xmlns:p14="http://schemas.microsoft.com/office/powerpoint/2010/main" val="169945705"/>
               </p:ext>
             </p:extLst>
           </p:nvPr>
@@ -3761,7 +3761,7 @@
                       </a:r>
                       <a:r>
                         <a:rPr lang="en-US" dirty="0"/>
-                        <a:t>() function computes the next actions and will not train the model on the fly, but only </a:t>
+                        <a:t>() function computes the next actions and will not train the model on the fly</a:t>
                       </a:r>
                     </a:p>
                     <a:p>

</xml_diff>

<commit_message>
sending rate environment added
</commit_message>
<xml_diff>
--- a/documentations/codeflow_asm.pptx
+++ b/documentations/codeflow_asm.pptx
@@ -260,7 +260,7 @@
           <a:p>
             <a:fld id="{330F189F-FDCA-3B49-BD71-3758360E44DC}" type="datetimeFigureOut">
               <a:rPr lang="en-US" smtClean="0"/>
-              <a:t>4/28/20</a:t>
+              <a:t>6/11/20</a:t>
             </a:fld>
             <a:endParaRPr lang="en-US"/>
           </a:p>
@@ -458,7 +458,7 @@
           <a:p>
             <a:fld id="{330F189F-FDCA-3B49-BD71-3758360E44DC}" type="datetimeFigureOut">
               <a:rPr lang="en-US" smtClean="0"/>
-              <a:t>4/28/20</a:t>
+              <a:t>6/11/20</a:t>
             </a:fld>
             <a:endParaRPr lang="en-US"/>
           </a:p>
@@ -666,7 +666,7 @@
           <a:p>
             <a:fld id="{330F189F-FDCA-3B49-BD71-3758360E44DC}" type="datetimeFigureOut">
               <a:rPr lang="en-US" smtClean="0"/>
-              <a:t>4/28/20</a:t>
+              <a:t>6/11/20</a:t>
             </a:fld>
             <a:endParaRPr lang="en-US"/>
           </a:p>
@@ -864,7 +864,7 @@
           <a:p>
             <a:fld id="{330F189F-FDCA-3B49-BD71-3758360E44DC}" type="datetimeFigureOut">
               <a:rPr lang="en-US" smtClean="0"/>
-              <a:t>4/28/20</a:t>
+              <a:t>6/11/20</a:t>
             </a:fld>
             <a:endParaRPr lang="en-US"/>
           </a:p>
@@ -1139,7 +1139,7 @@
           <a:p>
             <a:fld id="{330F189F-FDCA-3B49-BD71-3758360E44DC}" type="datetimeFigureOut">
               <a:rPr lang="en-US" smtClean="0"/>
-              <a:t>4/28/20</a:t>
+              <a:t>6/11/20</a:t>
             </a:fld>
             <a:endParaRPr lang="en-US"/>
           </a:p>
@@ -1404,7 +1404,7 @@
           <a:p>
             <a:fld id="{330F189F-FDCA-3B49-BD71-3758360E44DC}" type="datetimeFigureOut">
               <a:rPr lang="en-US" smtClean="0"/>
-              <a:t>4/28/20</a:t>
+              <a:t>6/11/20</a:t>
             </a:fld>
             <a:endParaRPr lang="en-US"/>
           </a:p>
@@ -1816,7 +1816,7 @@
           <a:p>
             <a:fld id="{330F189F-FDCA-3B49-BD71-3758360E44DC}" type="datetimeFigureOut">
               <a:rPr lang="en-US" smtClean="0"/>
-              <a:t>4/28/20</a:t>
+              <a:t>6/11/20</a:t>
             </a:fld>
             <a:endParaRPr lang="en-US"/>
           </a:p>
@@ -1957,7 +1957,7 @@
           <a:p>
             <a:fld id="{330F189F-FDCA-3B49-BD71-3758360E44DC}" type="datetimeFigureOut">
               <a:rPr lang="en-US" smtClean="0"/>
-              <a:t>4/28/20</a:t>
+              <a:t>6/11/20</a:t>
             </a:fld>
             <a:endParaRPr lang="en-US"/>
           </a:p>
@@ -2070,7 +2070,7 @@
           <a:p>
             <a:fld id="{330F189F-FDCA-3B49-BD71-3758360E44DC}" type="datetimeFigureOut">
               <a:rPr lang="en-US" smtClean="0"/>
-              <a:t>4/28/20</a:t>
+              <a:t>6/11/20</a:t>
             </a:fld>
             <a:endParaRPr lang="en-US"/>
           </a:p>
@@ -2381,7 +2381,7 @@
           <a:p>
             <a:fld id="{330F189F-FDCA-3B49-BD71-3758360E44DC}" type="datetimeFigureOut">
               <a:rPr lang="en-US" smtClean="0"/>
-              <a:t>4/28/20</a:t>
+              <a:t>6/11/20</a:t>
             </a:fld>
             <a:endParaRPr lang="en-US"/>
           </a:p>
@@ -2669,7 +2669,7 @@
           <a:p>
             <a:fld id="{330F189F-FDCA-3B49-BD71-3758360E44DC}" type="datetimeFigureOut">
               <a:rPr lang="en-US" smtClean="0"/>
-              <a:t>4/28/20</a:t>
+              <a:t>6/11/20</a:t>
             </a:fld>
             <a:endParaRPr lang="en-US"/>
           </a:p>
@@ -2910,7 +2910,7 @@
           <a:p>
             <a:fld id="{330F189F-FDCA-3B49-BD71-3758360E44DC}" type="datetimeFigureOut">
               <a:rPr lang="en-US" smtClean="0"/>
-              <a:t>4/28/20</a:t>
+              <a:t>6/11/20</a:t>
             </a:fld>
             <a:endParaRPr lang="en-US"/>
           </a:p>
@@ -4099,7 +4099,7 @@
             <a:pPr marL="1200150" lvl="2" indent="-285750"/>
             <a:r>
               <a:rPr lang="en-US" dirty="0"/>
-              <a:t>instantiates a model using </a:t>
+              <a:t>instantiates model, an instance of class </a:t>
             </a:r>
             <a:r>
               <a:rPr lang="en-US" dirty="0">
@@ -4134,7 +4134,7 @@
             <a:pPr marL="1200150" lvl="2" indent="-285750"/>
             <a:r>
               <a:rPr lang="en-US" dirty="0"/>
-              <a:t>trains the model by using </a:t>
+              <a:t>trains the model by </a:t>
             </a:r>
             <a:r>
               <a:rPr lang="en-US" dirty="0" err="1">
@@ -4519,25 +4519,7 @@
                 </a:solidFill>
                 <a:sym typeface="Wingdings" pitchFamily="2" charset="2"/>
               </a:rPr>
-              <a:t> = policy(</a:t>
-            </a:r>
-            <a:r>
-              <a:rPr lang="en-US" dirty="0" err="1">
-                <a:solidFill>
-                  <a:srgbClr val="00B050"/>
-                </a:solidFill>
-                <a:sym typeface="Wingdings" pitchFamily="2" charset="2"/>
-              </a:rPr>
-              <a:t>args</a:t>
-            </a:r>
-            <a:r>
-              <a:rPr lang="en-US" dirty="0">
-                <a:solidFill>
-                  <a:srgbClr val="00B050"/>
-                </a:solidFill>
-                <a:sym typeface="Wingdings" pitchFamily="2" charset="2"/>
-              </a:rPr>
-              <a:t>)</a:t>
+              <a:t> = policy()</a:t>
             </a:r>
             <a:endParaRPr lang="en-US" dirty="0">
               <a:solidFill>
@@ -4588,7 +4570,19 @@
               <a:rPr lang="en-US" dirty="0">
                 <a:sym typeface="Wingdings" pitchFamily="2" charset="2"/>
               </a:rPr>
-              <a:t>, which returns a policy defined in the class </a:t>
+              <a:t>, which returns </a:t>
+            </a:r>
+            <a:r>
+              <a:rPr lang="en-US">
+                <a:sym typeface="Wingdings" pitchFamily="2" charset="2"/>
+              </a:rPr>
+              <a:t>an instance of the </a:t>
+            </a:r>
+            <a:r>
+              <a:rPr lang="en-US" dirty="0">
+                <a:sym typeface="Wingdings" pitchFamily="2" charset="2"/>
+              </a:rPr>
+              <a:t>class </a:t>
             </a:r>
             <a:r>
               <a:rPr lang="en-US" dirty="0" err="1">

</xml_diff>